<commit_message>
Modify PDF/PPT of Chapter 6
- Deduplicating slide of chapter 6
</commit_message>
<xml_diff>
--- a/6. Windows Registry (1)/6.pptx
+++ b/6. Windows Registry (1)/6.pptx
@@ -25,7 +25,6 @@
     <p:sldId id="267" r:id="rId15"/>
     <p:sldId id="268" r:id="rId16"/>
     <p:sldId id="269" r:id="rId17"/>
-    <p:sldId id="270" r:id="rId18"/>
   </p:sldIdLst>
   <p:sldSz cx="9144000" cy="6858000" type="screen4x3"/>
   <p:notesSz cx="6805613" cy="9939338"/>
@@ -1103,7 +1102,9 @@
         </p:nvSpPr>
         <p:spPr/>
         <p:txBody>
-          <a:bodyPr/>
+          <a:bodyPr>
+            <a:normAutofit/>
+          </a:bodyPr>
           <a:lstStyle/>
           <a:p>
             <a:pPr lvl="0">
@@ -1141,97 +1142,6 @@
                 <a:defRPr/>
               </a:pPr>
               <a:t>14</a:t>
-            </a:fld>
-            <a:endParaRPr lang="en-US" altLang="en-US"/>
-          </a:p>
-        </p:txBody>
-      </p:sp>
-    </p:spTree>
-  </p:cSld>
-</p:notes>
-</file>
-
-<file path=ppt/notesSlides/notesSlide14.xml><?xml version="1.0" encoding="utf-8"?>
-<p:notes xmlns:r="http://schemas.openxmlformats.org/officeDocument/2006/relationships" xmlns:c="http://schemas.openxmlformats.org/drawingml/2006/chart" xmlns:a="http://schemas.openxmlformats.org/drawingml/2006/main" xmlns:dgm="http://schemas.openxmlformats.org/drawingml/2006/diagram" xmlns:dsp="http://schemas.microsoft.com/office/drawing/2008/diagram" xmlns:p="http://schemas.openxmlformats.org/presentationml/2006/main">
-  <p:cSld>
-    <p:spTree>
-      <p:nvGrpSpPr>
-        <p:cNvPr id="1" name=""/>
-        <p:cNvGrpSpPr/>
-        <p:nvPr/>
-      </p:nvGrpSpPr>
-      <p:grpSpPr>
-        <a:xfrm>
-          <a:off x="0" y="0"/>
-          <a:ext cx="0" cy="0"/>
-          <a:chOff x="0" y="0"/>
-          <a:chExt cx="0" cy="0"/>
-        </a:xfrm>
-      </p:grpSpPr>
-      <p:sp>
-        <p:nvSpPr>
-          <p:cNvPr id="2" name="슬라이드 이미지 개체 틀 1"/>
-          <p:cNvSpPr>
-            <a:spLocks noGrp="1" noRot="1" noChangeAspect="1" noTextEdit="1"/>
-          </p:cNvSpPr>
-          <p:nvPr>
-            <p:ph type="sldImg" idx="0"/>
-          </p:nvPr>
-        </p:nvSpPr>
-        <p:spPr/>
-      </p:sp>
-      <p:sp>
-        <p:nvSpPr>
-          <p:cNvPr id="3" name="슬라이드 노트 개체 틀 2"/>
-          <p:cNvSpPr>
-            <a:spLocks noGrp="1"/>
-          </p:cNvSpPr>
-          <p:nvPr>
-            <p:ph type="body" idx="1"/>
-          </p:nvPr>
-        </p:nvSpPr>
-        <p:spPr/>
-        <p:txBody>
-          <a:bodyPr>
-            <a:normAutofit/>
-          </a:bodyPr>
-          <a:lstStyle/>
-          <a:p>
-            <a:pPr lvl="0">
-              <a:defRPr/>
-            </a:pPr>
-            <a:r>
-              <a:rPr lang="ko-KR" altLang="en-US"/>
-              <a:t/>
-            </a:r>
-            <a:endParaRPr lang="ko-KR" altLang="en-US"/>
-          </a:p>
-        </p:txBody>
-      </p:sp>
-      <p:sp>
-        <p:nvSpPr>
-          <p:cNvPr id="4" name="슬라이드 번호 개체 틀 3"/>
-          <p:cNvSpPr>
-            <a:spLocks noGrp="1"/>
-          </p:cNvSpPr>
-          <p:nvPr>
-            <p:ph type="sldNum" sz="quarter" idx="10"/>
-          </p:nvPr>
-        </p:nvSpPr>
-        <p:spPr/>
-        <p:txBody>
-          <a:bodyPr/>
-          <a:lstStyle/>
-          <a:p>
-            <a:pPr lvl="0">
-              <a:defRPr/>
-            </a:pPr>
-            <a:fld id="{A0A51D67-0C14-4576-BCC5-A508196B7BB5}" type="slidenum">
-              <a:rPr lang="en-US" altLang="en-US"/>
-              <a:pPr lvl="0">
-                <a:defRPr/>
-              </a:pPr>
-              <a:t>15</a:t>
             </a:fld>
             <a:endParaRPr lang="en-US" altLang="en-US"/>
           </a:p>
@@ -6440,7 +6350,7 @@
         </p:nvSpPr>
         <p:spPr>
           <a:xfrm>
-            <a:off x="336726" y="1640634"/>
+            <a:off x="289100" y="2974134"/>
             <a:ext cx="8470548" cy="3769566"/>
           </a:xfrm>
           <a:prstGeom prst="rect">
@@ -6594,6 +6504,114 @@
               <a:buNone/>
               <a:defRPr/>
             </a:pPr>
+            <a:endParaRPr lang="en-US" altLang="ko-KR" sz="1200" b="1">
+              <a:solidFill>
+                <a:srgbClr val="3d3c3e"/>
+              </a:solidFill>
+            </a:endParaRPr>
+          </a:p>
+          <a:p>
+            <a:pPr marL="0" indent="0">
+              <a:buFont typeface="Arial"/>
+              <a:buNone/>
+              <a:defRPr/>
+            </a:pPr>
+            <a:endParaRPr lang="en-US" altLang="ko-KR" sz="1200" b="1">
+              <a:solidFill>
+                <a:srgbClr val="3d3c3e"/>
+              </a:solidFill>
+            </a:endParaRPr>
+          </a:p>
+          <a:p>
+            <a:pPr marL="0" indent="0">
+              <a:buFont typeface="Arial"/>
+              <a:buNone/>
+              <a:defRPr/>
+            </a:pPr>
+            <a:endParaRPr lang="en-US" altLang="ko-KR" sz="1200" b="1">
+              <a:solidFill>
+                <a:srgbClr val="3d3c3e"/>
+              </a:solidFill>
+            </a:endParaRPr>
+          </a:p>
+          <a:p>
+            <a:pPr marL="0" indent="0">
+              <a:buFont typeface="Arial"/>
+              <a:buNone/>
+              <a:defRPr/>
+            </a:pPr>
+            <a:endParaRPr lang="en-US" altLang="ko-KR" sz="1200" b="1">
+              <a:solidFill>
+                <a:srgbClr val="3d3c3e"/>
+              </a:solidFill>
+            </a:endParaRPr>
+          </a:p>
+          <a:p>
+            <a:pPr marL="0" indent="0">
+              <a:buFont typeface="Arial"/>
+              <a:buNone/>
+              <a:defRPr/>
+            </a:pPr>
+            <a:endParaRPr lang="en-US" altLang="ko-KR" sz="1200" b="1">
+              <a:solidFill>
+                <a:srgbClr val="3d3c3e"/>
+              </a:solidFill>
+            </a:endParaRPr>
+          </a:p>
+          <a:p>
+            <a:pPr marL="0" indent="0">
+              <a:buFont typeface="Arial"/>
+              <a:buNone/>
+              <a:defRPr/>
+            </a:pPr>
+            <a:endParaRPr lang="en-US" altLang="ko-KR" sz="1200" b="1">
+              <a:solidFill>
+                <a:srgbClr val="3d3c3e"/>
+              </a:solidFill>
+            </a:endParaRPr>
+          </a:p>
+          <a:p>
+            <a:pPr marL="0" indent="0">
+              <a:buFont typeface="Arial"/>
+              <a:buNone/>
+              <a:defRPr/>
+            </a:pPr>
+            <a:endParaRPr lang="en-US" altLang="ko-KR" sz="1200" b="1">
+              <a:solidFill>
+                <a:srgbClr val="3d3c3e"/>
+              </a:solidFill>
+            </a:endParaRPr>
+          </a:p>
+          <a:p>
+            <a:pPr marL="0" indent="0">
+              <a:buFont typeface="Arial"/>
+              <a:buNone/>
+              <a:defRPr/>
+            </a:pPr>
+            <a:endParaRPr lang="en-US" altLang="ko-KR" sz="1200" b="1">
+              <a:solidFill>
+                <a:srgbClr val="3d3c3e"/>
+              </a:solidFill>
+            </a:endParaRPr>
+          </a:p>
+          <a:p>
+            <a:pPr marL="0" indent="0">
+              <a:buFont typeface="Arial"/>
+              <a:buNone/>
+              <a:defRPr/>
+            </a:pPr>
+            <a:endParaRPr lang="en-US" altLang="ko-KR" sz="1200" b="1">
+              <a:solidFill>
+                <a:srgbClr val="3d3c3e"/>
+              </a:solidFill>
+            </a:endParaRPr>
+          </a:p>
+          <a:p>
+            <a:pPr marL="0" indent="0">
+              <a:buFont typeface="Arial"/>
+              <a:buNone/>
+              <a:defRPr/>
+            </a:pPr>
             <a:r>
               <a:rPr lang="en-US" altLang="ko-KR" sz="1200" b="1">
                 <a:solidFill>
@@ -6708,149 +6726,109 @@
                   <a:srgbClr val="3d3c3e"/>
                 </a:solidFill>
               </a:rPr>
-              <a:t>가변 길이 데이터</a:t>
+              <a:t>가변 길이 데이터 </a:t>
+            </a:r>
+            <a:r>
+              <a:rPr lang="en-US" altLang="ko-KR" sz="1200" b="1">
+                <a:solidFill>
+                  <a:srgbClr val="3d3c3e"/>
+                </a:solidFill>
+              </a:rPr>
+              <a:t>-&gt;</a:t>
+            </a:r>
+            <a:r>
+              <a:rPr lang="ko-KR" altLang="en-US" sz="1200" b="1">
+                <a:solidFill>
+                  <a:srgbClr val="3d3c3e"/>
+                </a:solidFill>
+              </a:rPr>
+              <a:t> </a:t>
+            </a:r>
+            <a:r>
+              <a:rPr lang="en-US" altLang="ko-KR" sz="1200" b="1">
+                <a:solidFill>
+                  <a:srgbClr val="3d3c3e"/>
+                </a:solidFill>
+              </a:rPr>
+              <a:t>REG_SZ</a:t>
+            </a:r>
+            <a:r>
+              <a:rPr lang="ko-KR" altLang="en-US" sz="1200" b="1">
+                <a:solidFill>
+                  <a:srgbClr val="3d3c3e"/>
+                </a:solidFill>
+              </a:rPr>
+              <a:t>는 </a:t>
+            </a:r>
+            <a:r>
+              <a:rPr lang="en-US" altLang="ko-KR" sz="1200" b="1">
+                <a:solidFill>
+                  <a:srgbClr val="3d3c3e"/>
+                </a:solidFill>
+              </a:rPr>
+              <a:t>EXPAND</a:t>
+            </a:r>
+            <a:r>
+              <a:rPr lang="ko-KR" altLang="en-US" sz="1200" b="1">
+                <a:solidFill>
+                  <a:srgbClr val="3d3c3e"/>
+                </a:solidFill>
+              </a:rPr>
+              <a:t>와 </a:t>
+            </a:r>
+            <a:r>
+              <a:rPr lang="en-US" altLang="ko-KR" sz="1200" b="1">
+                <a:solidFill>
+                  <a:srgbClr val="3d3c3e"/>
+                </a:solidFill>
+              </a:rPr>
+              <a:t>MULTI</a:t>
+            </a:r>
+            <a:r>
+              <a:rPr lang="ko-KR" altLang="en-US" sz="1200" b="1">
+                <a:solidFill>
+                  <a:srgbClr val="3d3c3e"/>
+                </a:solidFill>
+              </a:rPr>
+              <a:t>의 성격을 동시에 가지고 있다</a:t>
+            </a:r>
+            <a:r>
+              <a:rPr lang="en-US" altLang="ko-KR" sz="1200" b="1">
+                <a:solidFill>
+                  <a:srgbClr val="3d3c3e"/>
+                </a:solidFill>
+              </a:rPr>
+              <a:t>.</a:t>
+            </a:r>
+            <a:endParaRPr lang="en-US" altLang="ko-KR" sz="1200" b="1">
+              <a:solidFill>
+                <a:srgbClr val="3d3c3e"/>
+              </a:solidFill>
+            </a:endParaRPr>
+          </a:p>
+          <a:p>
+            <a:pPr marL="0" indent="0">
+              <a:buFont typeface="Arial"/>
+              <a:buNone/>
+              <a:defRPr/>
+            </a:pPr>
+            <a:r>
+              <a:rPr lang="en-US" altLang="ko-KR" sz="1200" b="1">
+                <a:solidFill>
+                  <a:srgbClr val="3d3c3e"/>
+                </a:solidFill>
+              </a:rPr>
+              <a:t>REG_LINK : </a:t>
+            </a:r>
+            <a:r>
+              <a:rPr lang="ko-KR" altLang="en-US" sz="1200" b="1">
+                <a:solidFill>
+                  <a:srgbClr val="3d3c3e"/>
+                </a:solidFill>
+              </a:rPr>
+              <a:t>심볼릭 링크 유니코드</a:t>
             </a:r>
             <a:endParaRPr lang="ko-KR" altLang="en-US" sz="1200" b="1">
-              <a:solidFill>
-                <a:srgbClr val="3d3c3e"/>
-              </a:solidFill>
-            </a:endParaRPr>
-          </a:p>
-          <a:p>
-            <a:pPr marL="0" indent="0">
-              <a:buFont typeface="Arial"/>
-              <a:buNone/>
-              <a:defRPr/>
-            </a:pPr>
-            <a:r>
-              <a:rPr lang="en-US" altLang="ko-KR" sz="1200" b="1">
-                <a:solidFill>
-                  <a:srgbClr val="3d3c3e"/>
-                </a:solidFill>
-              </a:rPr>
-              <a:t>REG_LINK : </a:t>
-            </a:r>
-            <a:r>
-              <a:rPr lang="ko-KR" altLang="en-US" sz="1200" b="1">
-                <a:solidFill>
-                  <a:srgbClr val="3d3c3e"/>
-                </a:solidFill>
-              </a:rPr>
-              <a:t>심볼릭 링크 유니코드</a:t>
-            </a:r>
-            <a:endParaRPr lang="ko-KR" altLang="en-US" sz="1200" b="1">
-              <a:solidFill>
-                <a:srgbClr val="3d3c3e"/>
-              </a:solidFill>
-            </a:endParaRPr>
-          </a:p>
-          <a:p>
-            <a:pPr marL="0" indent="0">
-              <a:buFont typeface="Arial"/>
-              <a:buNone/>
-              <a:defRPr/>
-            </a:pPr>
-            <a:r>
-              <a:rPr lang="en-US" altLang="ko-KR" sz="1200" b="1">
-                <a:solidFill>
-                  <a:srgbClr val="3d3c3e"/>
-                </a:solidFill>
-              </a:rPr>
-              <a:t>...</a:t>
-            </a:r>
-            <a:endParaRPr lang="en-US" altLang="ko-KR" sz="1200" b="1">
-              <a:solidFill>
-                <a:srgbClr val="3d3c3e"/>
-              </a:solidFill>
-            </a:endParaRPr>
-          </a:p>
-          <a:p>
-            <a:pPr marL="0" indent="0">
-              <a:buFont typeface="Arial"/>
-              <a:buNone/>
-              <a:defRPr/>
-            </a:pPr>
-            <a:endParaRPr lang="en-US" altLang="ko-KR" sz="1200" b="1">
-              <a:solidFill>
-                <a:srgbClr val="3d3c3e"/>
-              </a:solidFill>
-            </a:endParaRPr>
-          </a:p>
-          <a:p>
-            <a:pPr marL="0" indent="0">
-              <a:buFont typeface="Arial"/>
-              <a:buNone/>
-              <a:defRPr/>
-            </a:pPr>
-            <a:r>
-              <a:rPr lang="ko-KR" altLang="en-US" sz="1200" b="1">
-                <a:solidFill>
-                  <a:srgbClr val="3d3c3e"/>
-                </a:solidFill>
-              </a:rPr>
-              <a:t>이름 </a:t>
-            </a:r>
-            <a:r>
-              <a:rPr lang="en-US" altLang="ko-KR" sz="1200" b="1">
-                <a:solidFill>
-                  <a:srgbClr val="3d3c3e"/>
-                </a:solidFill>
-              </a:rPr>
-              <a:t>,</a:t>
-            </a:r>
-            <a:r>
-              <a:rPr lang="ko-KR" altLang="en-US" sz="1200" b="1">
-                <a:solidFill>
-                  <a:srgbClr val="3d3c3e"/>
-                </a:solidFill>
-              </a:rPr>
-              <a:t> 종류 </a:t>
-            </a:r>
-            <a:r>
-              <a:rPr lang="en-US" altLang="ko-KR" sz="1200" b="1">
-                <a:solidFill>
-                  <a:srgbClr val="3d3c3e"/>
-                </a:solidFill>
-              </a:rPr>
-              <a:t>, </a:t>
-            </a:r>
-            <a:r>
-              <a:rPr lang="ko-KR" altLang="en-US" sz="1200" b="1">
-                <a:solidFill>
-                  <a:srgbClr val="3d3c3e"/>
-                </a:solidFill>
-              </a:rPr>
-              <a:t>데이터로 나뉜다</a:t>
-            </a:r>
-            <a:r>
-              <a:rPr lang="en-US" altLang="ko-KR" sz="1200" b="1">
-                <a:solidFill>
-                  <a:srgbClr val="3d3c3e"/>
-                </a:solidFill>
-              </a:rPr>
-              <a:t>.</a:t>
-            </a:r>
-            <a:endParaRPr lang="en-US" altLang="ko-KR" sz="1200" b="1">
-              <a:solidFill>
-                <a:srgbClr val="3d3c3e"/>
-              </a:solidFill>
-            </a:endParaRPr>
-          </a:p>
-          <a:p>
-            <a:pPr marL="0" indent="0">
-              <a:buFont typeface="Arial"/>
-              <a:buNone/>
-              <a:defRPr/>
-            </a:pPr>
-            <a:r>
-              <a:rPr lang="en-US" altLang="ko-KR" sz="1200" b="1">
-                <a:solidFill>
-                  <a:srgbClr val="3d3c3e"/>
-                </a:solidFill>
-              </a:rPr>
-              <a:t>ex) KUICS / REG_DWORD / 0x00000001 (1)</a:t>
-            </a:r>
-            <a:endParaRPr lang="en-US" altLang="ko-KR" sz="1200" b="1">
               <a:solidFill>
                 <a:srgbClr val="3d3c3e"/>
               </a:solidFill>
@@ -6858,6 +6836,30 @@
           </a:p>
         </p:txBody>
       </p:sp>
+      <p:pic>
+        <p:nvPicPr>
+          <p:cNvPr id="32" name=""/>
+          <p:cNvPicPr>
+            <a:picLocks noChangeAspect="1"/>
+          </p:cNvPicPr>
+          <p:nvPr/>
+        </p:nvPicPr>
+        <p:blipFill rotWithShape="1">
+          <a:blip r:embed="rId3"/>
+          <a:stretch>
+            <a:fillRect/>
+          </a:stretch>
+        </p:blipFill>
+        <p:spPr>
+          <a:xfrm>
+            <a:off x="0" y="1579122"/>
+            <a:ext cx="9144000" cy="2556755"/>
+          </a:xfrm>
+          <a:prstGeom prst="rect">
+            <a:avLst/>
+          </a:prstGeom>
+        </p:spPr>
+      </p:pic>
     </p:spTree>
   </p:cSld>
   <p:clrMapOvr>
@@ -6970,650 +6972,6 @@
                 <a:latin typeface="맑은 고딕"/>
                 <a:ea typeface="맑은 고딕"/>
               </a:rPr>
-              <a:t>Registry Data Type</a:t>
-            </a:r>
-            <a:endParaRPr lang="en-US" altLang="ko-KR" sz="4000" b="1" spc="-150">
-              <a:solidFill>
-                <a:schemeClr val="accent4">
-                  <a:lumMod val="50000"/>
-                </a:schemeClr>
-              </a:solidFill>
-              <a:latin typeface="맑은 고딕"/>
-              <a:ea typeface="맑은 고딕"/>
-            </a:endParaRPr>
-          </a:p>
-        </p:txBody>
-      </p:sp>
-      <p:sp>
-        <p:nvSpPr>
-          <p:cNvPr id="8" name="내용 개체 틀 2"/>
-          <p:cNvSpPr txBox="1"/>
-          <p:nvPr/>
-        </p:nvSpPr>
-        <p:spPr>
-          <a:xfrm>
-            <a:off x="289100" y="2974134"/>
-            <a:ext cx="8470548" cy="3769566"/>
-          </a:xfrm>
-          <a:prstGeom prst="rect">
-            <a:avLst/>
-          </a:prstGeom>
-        </p:spPr>
-        <p:txBody>
-          <a:bodyPr vert="horz" lIns="91440" tIns="45720" rIns="91440" bIns="45720">
-            <a:normAutofit lnSpcReduction="10000"/>
-          </a:bodyPr>
-          <a:lstStyle>
-            <a:lvl1pPr marL="342900" indent="-342900" algn="l" defTabSz="914400" rtl="0" eaLnBrk="1" latinLnBrk="1" hangingPunct="1">
-              <a:spcBef>
-                <a:spcPct val="20000"/>
-              </a:spcBef>
-              <a:buFont typeface="Arial"/>
-              <a:buChar char="•"/>
-              <a:defRPr sz="3200" kern="1200">
-                <a:solidFill>
-                  <a:schemeClr val="tx1"/>
-                </a:solidFill>
-                <a:latin typeface="+mn-lt"/>
-                <a:ea typeface="+mn-ea"/>
-                <a:cs typeface="+mn-cs"/>
-              </a:defRPr>
-            </a:lvl1pPr>
-            <a:lvl2pPr marL="742950" indent="-285750" algn="l" defTabSz="914400" rtl="0" eaLnBrk="1" latinLnBrk="1" hangingPunct="1">
-              <a:spcBef>
-                <a:spcPct val="20000"/>
-              </a:spcBef>
-              <a:buFont typeface="Arial"/>
-              <a:buChar char="–"/>
-              <a:defRPr sz="2800" kern="1200">
-                <a:solidFill>
-                  <a:schemeClr val="tx1"/>
-                </a:solidFill>
-                <a:latin typeface="+mn-lt"/>
-                <a:ea typeface="+mn-ea"/>
-                <a:cs typeface="+mn-cs"/>
-              </a:defRPr>
-            </a:lvl2pPr>
-            <a:lvl3pPr marL="1143000" indent="-228600" algn="l" defTabSz="914400" rtl="0" eaLnBrk="1" latinLnBrk="1" hangingPunct="1">
-              <a:spcBef>
-                <a:spcPct val="20000"/>
-              </a:spcBef>
-              <a:buFont typeface="Arial"/>
-              <a:buChar char="•"/>
-              <a:defRPr sz="2400" kern="1200">
-                <a:solidFill>
-                  <a:schemeClr val="tx1"/>
-                </a:solidFill>
-                <a:latin typeface="+mn-lt"/>
-                <a:ea typeface="+mn-ea"/>
-                <a:cs typeface="+mn-cs"/>
-              </a:defRPr>
-            </a:lvl3pPr>
-            <a:lvl4pPr marL="1600200" indent="-228600" algn="l" defTabSz="914400" rtl="0" eaLnBrk="1" latinLnBrk="1" hangingPunct="1">
-              <a:spcBef>
-                <a:spcPct val="20000"/>
-              </a:spcBef>
-              <a:buFont typeface="Arial"/>
-              <a:buChar char="–"/>
-              <a:defRPr sz="2000" kern="1200">
-                <a:solidFill>
-                  <a:schemeClr val="tx1"/>
-                </a:solidFill>
-                <a:latin typeface="+mn-lt"/>
-                <a:ea typeface="+mn-ea"/>
-                <a:cs typeface="+mn-cs"/>
-              </a:defRPr>
-            </a:lvl4pPr>
-            <a:lvl5pPr marL="2057400" indent="-228600" algn="l" defTabSz="914400" rtl="0" eaLnBrk="1" latinLnBrk="1" hangingPunct="1">
-              <a:spcBef>
-                <a:spcPct val="20000"/>
-              </a:spcBef>
-              <a:buFont typeface="Arial"/>
-              <a:buChar char="»"/>
-              <a:defRPr sz="2000" kern="1200">
-                <a:solidFill>
-                  <a:schemeClr val="tx1"/>
-                </a:solidFill>
-                <a:latin typeface="+mn-lt"/>
-                <a:ea typeface="+mn-ea"/>
-                <a:cs typeface="+mn-cs"/>
-              </a:defRPr>
-            </a:lvl5pPr>
-            <a:lvl6pPr marL="2514600" indent="-228600" algn="l" defTabSz="914400" rtl="0" eaLnBrk="1" latinLnBrk="1" hangingPunct="1">
-              <a:spcBef>
-                <a:spcPct val="20000"/>
-              </a:spcBef>
-              <a:buFont typeface="Arial"/>
-              <a:buChar char="•"/>
-              <a:defRPr sz="2000" kern="1200">
-                <a:solidFill>
-                  <a:schemeClr val="tx1"/>
-                </a:solidFill>
-                <a:latin typeface="+mn-lt"/>
-                <a:ea typeface="+mn-ea"/>
-                <a:cs typeface="+mn-cs"/>
-              </a:defRPr>
-            </a:lvl6pPr>
-            <a:lvl7pPr marL="2971800" indent="-228600" algn="l" defTabSz="914400" rtl="0" eaLnBrk="1" latinLnBrk="1" hangingPunct="1">
-              <a:spcBef>
-                <a:spcPct val="20000"/>
-              </a:spcBef>
-              <a:buFont typeface="Arial"/>
-              <a:buChar char="•"/>
-              <a:defRPr sz="2000" kern="1200">
-                <a:solidFill>
-                  <a:schemeClr val="tx1"/>
-                </a:solidFill>
-                <a:latin typeface="+mn-lt"/>
-                <a:ea typeface="+mn-ea"/>
-                <a:cs typeface="+mn-cs"/>
-              </a:defRPr>
-            </a:lvl7pPr>
-            <a:lvl8pPr marL="3429000" indent="-228600" algn="l" defTabSz="914400" rtl="0" eaLnBrk="1" latinLnBrk="1" hangingPunct="1">
-              <a:spcBef>
-                <a:spcPct val="20000"/>
-              </a:spcBef>
-              <a:buFont typeface="Arial"/>
-              <a:buChar char="•"/>
-              <a:defRPr sz="2000" kern="1200">
-                <a:solidFill>
-                  <a:schemeClr val="tx1"/>
-                </a:solidFill>
-                <a:latin typeface="+mn-lt"/>
-                <a:ea typeface="+mn-ea"/>
-                <a:cs typeface="+mn-cs"/>
-              </a:defRPr>
-            </a:lvl8pPr>
-            <a:lvl9pPr marL="3886200" indent="-228600" algn="l" defTabSz="914400" rtl="0" eaLnBrk="1" latinLnBrk="1" hangingPunct="1">
-              <a:spcBef>
-                <a:spcPct val="20000"/>
-              </a:spcBef>
-              <a:buFont typeface="Arial"/>
-              <a:buChar char="•"/>
-              <a:defRPr sz="2000" kern="1200">
-                <a:solidFill>
-                  <a:schemeClr val="tx1"/>
-                </a:solidFill>
-                <a:latin typeface="+mn-lt"/>
-                <a:ea typeface="+mn-ea"/>
-                <a:cs typeface="+mn-cs"/>
-              </a:defRPr>
-            </a:lvl9pPr>
-          </a:lstStyle>
-          <a:p>
-            <a:pPr marL="0" indent="0">
-              <a:buFont typeface="Arial"/>
-              <a:buNone/>
-              <a:defRPr/>
-            </a:pPr>
-            <a:endParaRPr lang="en-US" altLang="ko-KR" sz="1200" b="1">
-              <a:solidFill>
-                <a:srgbClr val="3d3c3e"/>
-              </a:solidFill>
-            </a:endParaRPr>
-          </a:p>
-          <a:p>
-            <a:pPr marL="0" indent="0">
-              <a:buFont typeface="Arial"/>
-              <a:buNone/>
-              <a:defRPr/>
-            </a:pPr>
-            <a:endParaRPr lang="en-US" altLang="ko-KR" sz="1200" b="1">
-              <a:solidFill>
-                <a:srgbClr val="3d3c3e"/>
-              </a:solidFill>
-            </a:endParaRPr>
-          </a:p>
-          <a:p>
-            <a:pPr marL="0" indent="0">
-              <a:buFont typeface="Arial"/>
-              <a:buNone/>
-              <a:defRPr/>
-            </a:pPr>
-            <a:endParaRPr lang="en-US" altLang="ko-KR" sz="1200" b="1">
-              <a:solidFill>
-                <a:srgbClr val="3d3c3e"/>
-              </a:solidFill>
-            </a:endParaRPr>
-          </a:p>
-          <a:p>
-            <a:pPr marL="0" indent="0">
-              <a:buFont typeface="Arial"/>
-              <a:buNone/>
-              <a:defRPr/>
-            </a:pPr>
-            <a:endParaRPr lang="en-US" altLang="ko-KR" sz="1200" b="1">
-              <a:solidFill>
-                <a:srgbClr val="3d3c3e"/>
-              </a:solidFill>
-            </a:endParaRPr>
-          </a:p>
-          <a:p>
-            <a:pPr marL="0" indent="0">
-              <a:buFont typeface="Arial"/>
-              <a:buNone/>
-              <a:defRPr/>
-            </a:pPr>
-            <a:endParaRPr lang="en-US" altLang="ko-KR" sz="1200" b="1">
-              <a:solidFill>
-                <a:srgbClr val="3d3c3e"/>
-              </a:solidFill>
-            </a:endParaRPr>
-          </a:p>
-          <a:p>
-            <a:pPr marL="0" indent="0">
-              <a:buFont typeface="Arial"/>
-              <a:buNone/>
-              <a:defRPr/>
-            </a:pPr>
-            <a:endParaRPr lang="en-US" altLang="ko-KR" sz="1200" b="1">
-              <a:solidFill>
-                <a:srgbClr val="3d3c3e"/>
-              </a:solidFill>
-            </a:endParaRPr>
-          </a:p>
-          <a:p>
-            <a:pPr marL="0" indent="0">
-              <a:buFont typeface="Arial"/>
-              <a:buNone/>
-              <a:defRPr/>
-            </a:pPr>
-            <a:endParaRPr lang="en-US" altLang="ko-KR" sz="1200" b="1">
-              <a:solidFill>
-                <a:srgbClr val="3d3c3e"/>
-              </a:solidFill>
-            </a:endParaRPr>
-          </a:p>
-          <a:p>
-            <a:pPr marL="0" indent="0">
-              <a:buFont typeface="Arial"/>
-              <a:buNone/>
-              <a:defRPr/>
-            </a:pPr>
-            <a:endParaRPr lang="en-US" altLang="ko-KR" sz="1200" b="1">
-              <a:solidFill>
-                <a:srgbClr val="3d3c3e"/>
-              </a:solidFill>
-            </a:endParaRPr>
-          </a:p>
-          <a:p>
-            <a:pPr marL="0" indent="0">
-              <a:buFont typeface="Arial"/>
-              <a:buNone/>
-              <a:defRPr/>
-            </a:pPr>
-            <a:endParaRPr lang="en-US" altLang="ko-KR" sz="1200" b="1">
-              <a:solidFill>
-                <a:srgbClr val="3d3c3e"/>
-              </a:solidFill>
-            </a:endParaRPr>
-          </a:p>
-          <a:p>
-            <a:pPr marL="0" indent="0">
-              <a:buFont typeface="Arial"/>
-              <a:buNone/>
-              <a:defRPr/>
-            </a:pPr>
-            <a:r>
-              <a:rPr lang="en-US" altLang="ko-KR" sz="1200" b="1">
-                <a:solidFill>
-                  <a:srgbClr val="3d3c3e"/>
-                </a:solidFill>
-              </a:rPr>
-              <a:t>REG_DWORD : </a:t>
-            </a:r>
-            <a:r>
-              <a:rPr lang="ko-KR" altLang="en-US" sz="1200" b="1">
-                <a:solidFill>
-                  <a:srgbClr val="3d3c3e"/>
-                </a:solidFill>
-              </a:rPr>
-              <a:t>데이터를 </a:t>
-            </a:r>
-            <a:r>
-              <a:rPr lang="en-US" altLang="ko-KR" sz="1200" b="1">
-                <a:solidFill>
-                  <a:srgbClr val="3d3c3e"/>
-                </a:solidFill>
-              </a:rPr>
-              <a:t>4byte</a:t>
-            </a:r>
-            <a:r>
-              <a:rPr lang="ko-KR" altLang="en-US" sz="1200" b="1">
-                <a:solidFill>
-                  <a:srgbClr val="3d3c3e"/>
-                </a:solidFill>
-              </a:rPr>
-              <a:t>로 표현</a:t>
-            </a:r>
-            <a:endParaRPr lang="ko-KR" altLang="en-US" sz="1200" b="1">
-              <a:solidFill>
-                <a:srgbClr val="3d3c3e"/>
-              </a:solidFill>
-            </a:endParaRPr>
-          </a:p>
-          <a:p>
-            <a:pPr marL="0" indent="0">
-              <a:buFont typeface="Arial"/>
-              <a:buNone/>
-              <a:defRPr/>
-            </a:pPr>
-            <a:r>
-              <a:rPr lang="en-US" altLang="ko-KR" sz="1200" b="1">
-                <a:solidFill>
-                  <a:srgbClr val="3d3c3e"/>
-                </a:solidFill>
-              </a:rPr>
-              <a:t>REG_BINARY : </a:t>
-            </a:r>
-            <a:r>
-              <a:rPr lang="ko-KR" altLang="en-US" sz="1200" b="1">
-                <a:solidFill>
-                  <a:srgbClr val="3d3c3e"/>
-                </a:solidFill>
-              </a:rPr>
-              <a:t>이진 데이터</a:t>
-            </a:r>
-            <a:endParaRPr lang="ko-KR" altLang="en-US" sz="1200" b="1">
-              <a:solidFill>
-                <a:srgbClr val="3d3c3e"/>
-              </a:solidFill>
-            </a:endParaRPr>
-          </a:p>
-          <a:p>
-            <a:pPr marL="0" indent="0">
-              <a:buFont typeface="Arial"/>
-              <a:buNone/>
-              <a:defRPr/>
-            </a:pPr>
-            <a:r>
-              <a:rPr lang="en-US" altLang="ko-KR" sz="1200" b="1">
-                <a:solidFill>
-                  <a:srgbClr val="3d3c3e"/>
-                </a:solidFill>
-              </a:rPr>
-              <a:t>REG_SIZE : </a:t>
-            </a:r>
-            <a:r>
-              <a:rPr lang="ko-KR" altLang="en-US" sz="1200" b="1">
-                <a:solidFill>
-                  <a:srgbClr val="3d3c3e"/>
-                </a:solidFill>
-              </a:rPr>
-              <a:t>고정 길이 문자열</a:t>
-            </a:r>
-            <a:endParaRPr lang="ko-KR" altLang="en-US" sz="1200" b="1">
-              <a:solidFill>
-                <a:srgbClr val="3d3c3e"/>
-              </a:solidFill>
-            </a:endParaRPr>
-          </a:p>
-          <a:p>
-            <a:pPr marL="0" indent="0">
-              <a:buFont typeface="Arial"/>
-              <a:buNone/>
-              <a:defRPr/>
-            </a:pPr>
-            <a:r>
-              <a:rPr lang="en-US" altLang="ko-KR" sz="1200" b="1">
-                <a:solidFill>
-                  <a:srgbClr val="3d3c3e"/>
-                </a:solidFill>
-              </a:rPr>
-              <a:t>REG_EXPAND_SZ : </a:t>
-            </a:r>
-            <a:r>
-              <a:rPr lang="ko-KR" altLang="en-US" sz="1200" b="1">
-                <a:solidFill>
-                  <a:srgbClr val="3d3c3e"/>
-                </a:solidFill>
-              </a:rPr>
-              <a:t>가변 길이 데이터 </a:t>
-            </a:r>
-            <a:r>
-              <a:rPr lang="en-US" altLang="ko-KR" sz="1200" b="1">
-                <a:solidFill>
-                  <a:srgbClr val="3d3c3e"/>
-                </a:solidFill>
-              </a:rPr>
-              <a:t>-&gt;</a:t>
-            </a:r>
-            <a:r>
-              <a:rPr lang="ko-KR" altLang="en-US" sz="1200" b="1">
-                <a:solidFill>
-                  <a:srgbClr val="3d3c3e"/>
-                </a:solidFill>
-              </a:rPr>
-              <a:t> </a:t>
-            </a:r>
-            <a:r>
-              <a:rPr lang="en-US" altLang="ko-KR" sz="1200" b="1">
-                <a:solidFill>
-                  <a:srgbClr val="3d3c3e"/>
-                </a:solidFill>
-              </a:rPr>
-              <a:t>REG_SZ</a:t>
-            </a:r>
-            <a:r>
-              <a:rPr lang="ko-KR" altLang="en-US" sz="1200" b="1">
-                <a:solidFill>
-                  <a:srgbClr val="3d3c3e"/>
-                </a:solidFill>
-              </a:rPr>
-              <a:t>는 </a:t>
-            </a:r>
-            <a:r>
-              <a:rPr lang="en-US" altLang="ko-KR" sz="1200" b="1">
-                <a:solidFill>
-                  <a:srgbClr val="3d3c3e"/>
-                </a:solidFill>
-              </a:rPr>
-              <a:t>EXPAND</a:t>
-            </a:r>
-            <a:r>
-              <a:rPr lang="ko-KR" altLang="en-US" sz="1200" b="1">
-                <a:solidFill>
-                  <a:srgbClr val="3d3c3e"/>
-                </a:solidFill>
-              </a:rPr>
-              <a:t>와 </a:t>
-            </a:r>
-            <a:r>
-              <a:rPr lang="en-US" altLang="ko-KR" sz="1200" b="1">
-                <a:solidFill>
-                  <a:srgbClr val="3d3c3e"/>
-                </a:solidFill>
-              </a:rPr>
-              <a:t>MULTI</a:t>
-            </a:r>
-            <a:r>
-              <a:rPr lang="ko-KR" altLang="en-US" sz="1200" b="1">
-                <a:solidFill>
-                  <a:srgbClr val="3d3c3e"/>
-                </a:solidFill>
-              </a:rPr>
-              <a:t>의 성격을 동시에 가지고 있다</a:t>
-            </a:r>
-            <a:r>
-              <a:rPr lang="en-US" altLang="ko-KR" sz="1200" b="1">
-                <a:solidFill>
-                  <a:srgbClr val="3d3c3e"/>
-                </a:solidFill>
-              </a:rPr>
-              <a:t>.</a:t>
-            </a:r>
-            <a:endParaRPr lang="en-US" altLang="ko-KR" sz="1200" b="1">
-              <a:solidFill>
-                <a:srgbClr val="3d3c3e"/>
-              </a:solidFill>
-            </a:endParaRPr>
-          </a:p>
-          <a:p>
-            <a:pPr marL="0" indent="0">
-              <a:buFont typeface="Arial"/>
-              <a:buNone/>
-              <a:defRPr/>
-            </a:pPr>
-            <a:r>
-              <a:rPr lang="en-US" altLang="ko-KR" sz="1200" b="1">
-                <a:solidFill>
-                  <a:srgbClr val="3d3c3e"/>
-                </a:solidFill>
-              </a:rPr>
-              <a:t>REG_LINK : </a:t>
-            </a:r>
-            <a:r>
-              <a:rPr lang="ko-KR" altLang="en-US" sz="1200" b="1">
-                <a:solidFill>
-                  <a:srgbClr val="3d3c3e"/>
-                </a:solidFill>
-              </a:rPr>
-              <a:t>심볼릭 링크 유니코드</a:t>
-            </a:r>
-            <a:endParaRPr lang="ko-KR" altLang="en-US" sz="1200" b="1">
-              <a:solidFill>
-                <a:srgbClr val="3d3c3e"/>
-              </a:solidFill>
-            </a:endParaRPr>
-          </a:p>
-        </p:txBody>
-      </p:sp>
-      <p:pic>
-        <p:nvPicPr>
-          <p:cNvPr id="32" name=""/>
-          <p:cNvPicPr>
-            <a:picLocks noChangeAspect="1"/>
-          </p:cNvPicPr>
-          <p:nvPr/>
-        </p:nvPicPr>
-        <p:blipFill rotWithShape="1">
-          <a:blip r:embed="rId3"/>
-          <a:stretch>
-            <a:fillRect/>
-          </a:stretch>
-        </p:blipFill>
-        <p:spPr>
-          <a:xfrm>
-            <a:off x="0" y="1579122"/>
-            <a:ext cx="9144000" cy="2556755"/>
-          </a:xfrm>
-          <a:prstGeom prst="rect">
-            <a:avLst/>
-          </a:prstGeom>
-        </p:spPr>
-      </p:pic>
-    </p:spTree>
-  </p:cSld>
-  <p:clrMapOvr>
-    <a:masterClrMapping/>
-  </p:clrMapOvr>
-  <mc:AlternateContent xmlns:mc="http://schemas.openxmlformats.org/markup-compatibility/2006">
-    <mc:Choice xmlns:p14="http://schemas.microsoft.com/office/powerpoint/2010/main" Requires="p14">
-      <p:transition xmlns:mc="http://schemas.openxmlformats.org/markup-compatibility/2006" xmlns:p14="http://schemas.microsoft.com/office/powerpoint/2010/main" mc:Ignorable="p14" p14:dur="500"/>
-    </mc:Choice>
-    <mc:Fallback>
-      <p:transition/>
-    </mc:Fallback>
-  </mc:AlternateContent>
-  <p:timing>
-    <p:tnLst>
-      <p:par>
-        <p:cTn id="1" dur="indefinite" restart="never" nodeType="tmRoot"/>
-      </p:par>
-    </p:tnLst>
-  </p:timing>
-</p:sld>
-</file>
-
-<file path=ppt/slides/slide14.xml><?xml version="1.0" encoding="utf-8"?>
-<p:sld xmlns:r="http://schemas.openxmlformats.org/officeDocument/2006/relationships" xmlns:c="http://schemas.openxmlformats.org/drawingml/2006/chart" xmlns:a="http://schemas.openxmlformats.org/drawingml/2006/main" xmlns:dgm="http://schemas.openxmlformats.org/drawingml/2006/diagram" xmlns:dsp="http://schemas.microsoft.com/office/drawing/2008/diagram" xmlns:p="http://schemas.openxmlformats.org/presentationml/2006/main">
-  <p:cSld>
-    <p:spTree>
-      <p:nvGrpSpPr>
-        <p:cNvPr id="1" name=""/>
-        <p:cNvGrpSpPr/>
-        <p:nvPr/>
-      </p:nvGrpSpPr>
-      <p:grpSpPr>
-        <a:xfrm>
-          <a:off x="0" y="0"/>
-          <a:ext cx="0" cy="0"/>
-          <a:chOff x="0" y="0"/>
-          <a:chExt cx="0" cy="0"/>
-        </a:xfrm>
-      </p:grpSpPr>
-      <p:cxnSp>
-        <p:nvCxnSpPr>
-          <p:cNvPr id="20" name="직선 연결선 19"/>
-          <p:cNvCxnSpPr/>
-          <p:nvPr/>
-        </p:nvCxnSpPr>
-        <p:spPr>
-          <a:xfrm>
-            <a:off x="364803" y="547859"/>
-            <a:ext cx="8406000" cy="0"/>
-          </a:xfrm>
-          <a:prstGeom prst="line">
-            <a:avLst/>
-          </a:prstGeom>
-          <a:ln w="3175">
-            <a:solidFill>
-              <a:schemeClr val="accent4">
-                <a:lumMod val="50000"/>
-              </a:schemeClr>
-            </a:solidFill>
-          </a:ln>
-        </p:spPr>
-        <p:style>
-          <a:lnRef idx="1">
-            <a:schemeClr val="accent1"/>
-          </a:lnRef>
-          <a:fillRef idx="0">
-            <a:schemeClr val="accent1"/>
-          </a:fillRef>
-          <a:effectRef idx="0">
-            <a:schemeClr val="accent1"/>
-          </a:effectRef>
-          <a:fontRef idx="minor">
-            <a:schemeClr val="tx1"/>
-          </a:fontRef>
-        </p:style>
-      </p:cxnSp>
-      <p:sp>
-        <p:nvSpPr>
-          <p:cNvPr id="31" name="제목 1"/>
-          <p:cNvSpPr>
-            <a:spLocks noGrp="1"/>
-          </p:cNvSpPr>
-          <p:nvPr>
-            <p:ph type="title" idx="0"/>
-          </p:nvPr>
-        </p:nvSpPr>
-        <p:spPr>
-          <a:xfrm>
-            <a:off x="256544" y="700126"/>
-            <a:ext cx="6995120" cy="580926"/>
-          </a:xfrm>
-        </p:spPr>
-        <p:txBody>
-          <a:bodyPr>
-            <a:noAutofit/>
-          </a:bodyPr>
-          <a:lstStyle/>
-          <a:p>
-            <a:pPr algn="l">
-              <a:defRPr/>
-            </a:pPr>
-            <a:r>
-              <a:rPr lang="en-US" altLang="ko-KR" sz="4000" b="1" spc="-150">
-                <a:solidFill>
-                  <a:schemeClr val="accent4">
-                    <a:lumMod val="50000"/>
-                  </a:schemeClr>
-                </a:solidFill>
-                <a:latin typeface="맑은 고딕"/>
-                <a:ea typeface="맑은 고딕"/>
-              </a:rPr>
               <a:t>Registry Path</a:t>
             </a:r>
             <a:endParaRPr lang="en-US" altLang="ko-KR" sz="4000" b="1" spc="-150">
@@ -8049,7 +7407,7 @@
 </p:sld>
 </file>
 
-<file path=ppt/slides/slide15.xml><?xml version="1.0" encoding="utf-8"?>
+<file path=ppt/slides/slide14.xml><?xml version="1.0" encoding="utf-8"?>
 <p:sld xmlns:r="http://schemas.openxmlformats.org/officeDocument/2006/relationships" xmlns:c="http://schemas.openxmlformats.org/drawingml/2006/chart" xmlns:a="http://schemas.openxmlformats.org/drawingml/2006/main" xmlns:dgm="http://schemas.openxmlformats.org/drawingml/2006/diagram" xmlns:dsp="http://schemas.microsoft.com/office/drawing/2008/diagram" xmlns:p="http://schemas.openxmlformats.org/presentationml/2006/main">
   <p:cSld>
     <p:spTree>

</xml_diff>